<commit_message>
Add results sheet and slides
</commit_message>
<xml_diff>
--- a/codex_vs_gpt3.pptx
+++ b/codex_vs_gpt3.pptx
@@ -8,9 +8,10 @@
     <p:sldId id="256" r:id="rId2"/>
     <p:sldId id="257" r:id="rId3"/>
     <p:sldId id="258" r:id="rId4"/>
-    <p:sldId id="259" r:id="rId5"/>
-    <p:sldId id="260" r:id="rId6"/>
-    <p:sldId id="261" r:id="rId7"/>
+    <p:sldId id="262" r:id="rId5"/>
+    <p:sldId id="259" r:id="rId6"/>
+    <p:sldId id="260" r:id="rId7"/>
+    <p:sldId id="261" r:id="rId8"/>
   </p:sldIdLst>
   <p:sldSz cx="12192000" cy="6858000"/>
   <p:notesSz cx="6858000" cy="9144000"/>
@@ -109,6 +110,11 @@
       </a:defRPr>
     </a:lvl9pPr>
   </p:defaultTextStyle>
+  <p:extLst>
+    <p:ext uri="{EFAFB233-063F-42B5-8137-9DF3F51BA10A}">
+      <p15:sldGuideLst xmlns:p15="http://schemas.microsoft.com/office/powerpoint/2012/main"/>
+    </p:ext>
+  </p:extLst>
 </p:presentation>
 </file>
 
@@ -259,7 +265,7 @@
           <a:p>
             <a:fld id="{C30C57EA-99D9-463E-A348-C1AB3F07850D}" type="datetimeFigureOut">
               <a:rPr lang="en-US" smtClean="0"/>
-              <a:t>11/30/2022</a:t>
+              <a:t>12/1/2022</a:t>
             </a:fld>
             <a:endParaRPr lang="en-US"/>
           </a:p>
@@ -457,7 +463,7 @@
           <a:p>
             <a:fld id="{C30C57EA-99D9-463E-A348-C1AB3F07850D}" type="datetimeFigureOut">
               <a:rPr lang="en-US" smtClean="0"/>
-              <a:t>11/30/2022</a:t>
+              <a:t>12/1/2022</a:t>
             </a:fld>
             <a:endParaRPr lang="en-US"/>
           </a:p>
@@ -665,7 +671,7 @@
           <a:p>
             <a:fld id="{C30C57EA-99D9-463E-A348-C1AB3F07850D}" type="datetimeFigureOut">
               <a:rPr lang="en-US" smtClean="0"/>
-              <a:t>11/30/2022</a:t>
+              <a:t>12/1/2022</a:t>
             </a:fld>
             <a:endParaRPr lang="en-US"/>
           </a:p>
@@ -863,7 +869,7 @@
           <a:p>
             <a:fld id="{C30C57EA-99D9-463E-A348-C1AB3F07850D}" type="datetimeFigureOut">
               <a:rPr lang="en-US" smtClean="0"/>
-              <a:t>11/30/2022</a:t>
+              <a:t>12/1/2022</a:t>
             </a:fld>
             <a:endParaRPr lang="en-US"/>
           </a:p>
@@ -1138,7 +1144,7 @@
           <a:p>
             <a:fld id="{C30C57EA-99D9-463E-A348-C1AB3F07850D}" type="datetimeFigureOut">
               <a:rPr lang="en-US" smtClean="0"/>
-              <a:t>11/30/2022</a:t>
+              <a:t>12/1/2022</a:t>
             </a:fld>
             <a:endParaRPr lang="en-US"/>
           </a:p>
@@ -1403,7 +1409,7 @@
           <a:p>
             <a:fld id="{C30C57EA-99D9-463E-A348-C1AB3F07850D}" type="datetimeFigureOut">
               <a:rPr lang="en-US" smtClean="0"/>
-              <a:t>11/30/2022</a:t>
+              <a:t>12/1/2022</a:t>
             </a:fld>
             <a:endParaRPr lang="en-US"/>
           </a:p>
@@ -1815,7 +1821,7 @@
           <a:p>
             <a:fld id="{C30C57EA-99D9-463E-A348-C1AB3F07850D}" type="datetimeFigureOut">
               <a:rPr lang="en-US" smtClean="0"/>
-              <a:t>11/30/2022</a:t>
+              <a:t>12/1/2022</a:t>
             </a:fld>
             <a:endParaRPr lang="en-US"/>
           </a:p>
@@ -1956,7 +1962,7 @@
           <a:p>
             <a:fld id="{C30C57EA-99D9-463E-A348-C1AB3F07850D}" type="datetimeFigureOut">
               <a:rPr lang="en-US" smtClean="0"/>
-              <a:t>11/30/2022</a:t>
+              <a:t>12/1/2022</a:t>
             </a:fld>
             <a:endParaRPr lang="en-US"/>
           </a:p>
@@ -2069,7 +2075,7 @@
           <a:p>
             <a:fld id="{C30C57EA-99D9-463E-A348-C1AB3F07850D}" type="datetimeFigureOut">
               <a:rPr lang="en-US" smtClean="0"/>
-              <a:t>11/30/2022</a:t>
+              <a:t>12/1/2022</a:t>
             </a:fld>
             <a:endParaRPr lang="en-US"/>
           </a:p>
@@ -2380,7 +2386,7 @@
           <a:p>
             <a:fld id="{C30C57EA-99D9-463E-A348-C1AB3F07850D}" type="datetimeFigureOut">
               <a:rPr lang="en-US" smtClean="0"/>
-              <a:t>11/30/2022</a:t>
+              <a:t>12/1/2022</a:t>
             </a:fld>
             <a:endParaRPr lang="en-US"/>
           </a:p>
@@ -2668,7 +2674,7 @@
           <a:p>
             <a:fld id="{C30C57EA-99D9-463E-A348-C1AB3F07850D}" type="datetimeFigureOut">
               <a:rPr lang="en-US" smtClean="0"/>
-              <a:t>11/30/2022</a:t>
+              <a:t>12/1/2022</a:t>
             </a:fld>
             <a:endParaRPr lang="en-US"/>
           </a:p>
@@ -2909,7 +2915,7 @@
           <a:p>
             <a:fld id="{C30C57EA-99D9-463E-A348-C1AB3F07850D}" type="datetimeFigureOut">
               <a:rPr lang="en-US" smtClean="0"/>
-              <a:t>11/30/2022</a:t>
+              <a:t>12/1/2022</a:t>
             </a:fld>
             <a:endParaRPr lang="en-US"/>
           </a:p>
@@ -3749,6 +3755,86 @@
           <p:cNvPr id="2" name="Title 1">
             <a:extLst>
               <a:ext uri="{FF2B5EF4-FFF2-40B4-BE49-F238E27FC236}">
+                <a16:creationId xmlns:a16="http://schemas.microsoft.com/office/drawing/2014/main" id="{77B7B65F-5DB6-F264-FECB-7DE904C746B5}"/>
+              </a:ext>
+            </a:extLst>
+          </p:cNvPr>
+          <p:cNvSpPr>
+            <a:spLocks noGrp="1"/>
+          </p:cNvSpPr>
+          <p:nvPr>
+            <p:ph type="title"/>
+          </p:nvPr>
+        </p:nvSpPr>
+        <p:spPr/>
+        <p:txBody>
+          <a:bodyPr/>
+          <a:lstStyle/>
+          <a:p>
+            <a:endParaRPr lang="en-US"/>
+          </a:p>
+        </p:txBody>
+      </p:sp>
+      <p:sp>
+        <p:nvSpPr>
+          <p:cNvPr id="3" name="Content Placeholder 2">
+            <a:extLst>
+              <a:ext uri="{FF2B5EF4-FFF2-40B4-BE49-F238E27FC236}">
+                <a16:creationId xmlns:a16="http://schemas.microsoft.com/office/drawing/2014/main" id="{339F922A-D518-77AE-E9E9-977B4C0E7EAE}"/>
+              </a:ext>
+            </a:extLst>
+          </p:cNvPr>
+          <p:cNvSpPr>
+            <a:spLocks noGrp="1"/>
+          </p:cNvSpPr>
+          <p:nvPr>
+            <p:ph idx="1"/>
+          </p:nvPr>
+        </p:nvSpPr>
+        <p:spPr/>
+        <p:txBody>
+          <a:bodyPr/>
+          <a:lstStyle/>
+          <a:p>
+            <a:endParaRPr lang="en-US"/>
+          </a:p>
+        </p:txBody>
+      </p:sp>
+    </p:spTree>
+    <p:extLst>
+      <p:ext uri="{BB962C8B-B14F-4D97-AF65-F5344CB8AC3E}">
+        <p14:creationId xmlns:p14="http://schemas.microsoft.com/office/powerpoint/2010/main" val="1929449303"/>
+      </p:ext>
+    </p:extLst>
+  </p:cSld>
+  <p:clrMapOvr>
+    <a:masterClrMapping/>
+  </p:clrMapOvr>
+</p:sld>
+</file>
+
+<file path=ppt/slides/slide5.xml><?xml version="1.0" encoding="utf-8"?>
+<p:sld xmlns:a="http://schemas.openxmlformats.org/drawingml/2006/main" xmlns:r="http://schemas.openxmlformats.org/officeDocument/2006/relationships" xmlns:p="http://schemas.openxmlformats.org/presentationml/2006/main">
+  <p:cSld>
+    <p:spTree>
+      <p:nvGrpSpPr>
+        <p:cNvPr id="1" name=""/>
+        <p:cNvGrpSpPr/>
+        <p:nvPr/>
+      </p:nvGrpSpPr>
+      <p:grpSpPr>
+        <a:xfrm>
+          <a:off x="0" y="0"/>
+          <a:ext cx="0" cy="0"/>
+          <a:chOff x="0" y="0"/>
+          <a:chExt cx="0" cy="0"/>
+        </a:xfrm>
+      </p:grpSpPr>
+      <p:sp>
+        <p:nvSpPr>
+          <p:cNvPr id="2" name="Title 1">
+            <a:extLst>
+              <a:ext uri="{FF2B5EF4-FFF2-40B4-BE49-F238E27FC236}">
                 <a16:creationId xmlns:a16="http://schemas.microsoft.com/office/drawing/2014/main" id="{1A5B5E29-AC22-0027-EC8D-F2756A31609E}"/>
               </a:ext>
             </a:extLst>
@@ -4030,7 +4116,7 @@
 </p:sld>
 </file>
 
-<file path=ppt/slides/slide5.xml><?xml version="1.0" encoding="utf-8"?>
+<file path=ppt/slides/slide6.xml><?xml version="1.0" encoding="utf-8"?>
 <p:sld xmlns:a="http://schemas.openxmlformats.org/drawingml/2006/main" xmlns:r="http://schemas.openxmlformats.org/officeDocument/2006/relationships" xmlns:p="http://schemas.openxmlformats.org/presentationml/2006/main">
   <p:cSld>
     <p:spTree>
@@ -6525,7 +6611,7 @@
 </p:sld>
 </file>
 
-<file path=ppt/slides/slide6.xml><?xml version="1.0" encoding="utf-8"?>
+<file path=ppt/slides/slide7.xml><?xml version="1.0" encoding="utf-8"?>
 <p:sld xmlns:a="http://schemas.openxmlformats.org/drawingml/2006/main" xmlns:r="http://schemas.openxmlformats.org/officeDocument/2006/relationships" xmlns:p="http://schemas.openxmlformats.org/presentationml/2006/main">
   <p:cSld>
     <p:spTree>

</xml_diff>